<commit_message>
initial skeleton of presentation
</commit_message>
<xml_diff>
--- a/Presentation.pptx
+++ b/Presentation.pptx
@@ -7,11 +7,13 @@
   <p:sldIdLst>
     <p:sldId id="256" r:id="rId2"/>
     <p:sldId id="257" r:id="rId3"/>
-    <p:sldId id="258" r:id="rId4"/>
-    <p:sldId id="259" r:id="rId5"/>
-    <p:sldId id="260" r:id="rId6"/>
-    <p:sldId id="261" r:id="rId7"/>
-    <p:sldId id="262" r:id="rId8"/>
+    <p:sldId id="259" r:id="rId4"/>
+    <p:sldId id="263" r:id="rId5"/>
+    <p:sldId id="264" r:id="rId6"/>
+    <p:sldId id="260" r:id="rId7"/>
+    <p:sldId id="261" r:id="rId8"/>
+    <p:sldId id="262" r:id="rId9"/>
+    <p:sldId id="265" r:id="rId10"/>
   </p:sldIdLst>
   <p:sldSz cx="12192000" cy="6858000"/>
   <p:notesSz cx="6858000" cy="9144000"/>
@@ -840,7 +842,7 @@
           <a:p>
             <a:fld id="{3EE02DEA-DAE7-412D-98C1-743910D649DD}" type="datetimeFigureOut">
               <a:rPr lang="en-GB" smtClean="0"/>
-              <a:t>23/03/2022</a:t>
+              <a:t>24/03/2022</a:t>
             </a:fld>
             <a:endParaRPr lang="en-GB"/>
           </a:p>
@@ -1091,7 +1093,7 @@
           <a:p>
             <a:fld id="{3EE02DEA-DAE7-412D-98C1-743910D649DD}" type="datetimeFigureOut">
               <a:rPr lang="en-GB" smtClean="0"/>
-              <a:t>23/03/2022</a:t>
+              <a:t>24/03/2022</a:t>
             </a:fld>
             <a:endParaRPr lang="en-GB"/>
           </a:p>
@@ -1405,7 +1407,7 @@
           <a:p>
             <a:fld id="{3EE02DEA-DAE7-412D-98C1-743910D649DD}" type="datetimeFigureOut">
               <a:rPr lang="en-GB" smtClean="0"/>
-              <a:t>23/03/2022</a:t>
+              <a:t>24/03/2022</a:t>
             </a:fld>
             <a:endParaRPr lang="en-GB"/>
           </a:p>
@@ -1746,7 +1748,7 @@
           <a:p>
             <a:fld id="{3EE02DEA-DAE7-412D-98C1-743910D649DD}" type="datetimeFigureOut">
               <a:rPr lang="en-GB" smtClean="0"/>
-              <a:t>23/03/2022</a:t>
+              <a:t>24/03/2022</a:t>
             </a:fld>
             <a:endParaRPr lang="en-GB"/>
           </a:p>
@@ -2060,7 +2062,7 @@
           <a:p>
             <a:fld id="{3EE02DEA-DAE7-412D-98C1-743910D649DD}" type="datetimeFigureOut">
               <a:rPr lang="en-GB" smtClean="0"/>
-              <a:t>23/03/2022</a:t>
+              <a:t>24/03/2022</a:t>
             </a:fld>
             <a:endParaRPr lang="en-GB"/>
           </a:p>
@@ -2453,7 +2455,7 @@
           <a:p>
             <a:fld id="{3EE02DEA-DAE7-412D-98C1-743910D649DD}" type="datetimeFigureOut">
               <a:rPr lang="en-GB" smtClean="0"/>
-              <a:t>23/03/2022</a:t>
+              <a:t>24/03/2022</a:t>
             </a:fld>
             <a:endParaRPr lang="en-GB"/>
           </a:p>
@@ -2623,7 +2625,7 @@
           <a:p>
             <a:fld id="{3EE02DEA-DAE7-412D-98C1-743910D649DD}" type="datetimeFigureOut">
               <a:rPr lang="en-GB" smtClean="0"/>
-              <a:t>23/03/2022</a:t>
+              <a:t>24/03/2022</a:t>
             </a:fld>
             <a:endParaRPr lang="en-GB"/>
           </a:p>
@@ -2803,7 +2805,7 @@
           <a:p>
             <a:fld id="{3EE02DEA-DAE7-412D-98C1-743910D649DD}" type="datetimeFigureOut">
               <a:rPr lang="en-GB" smtClean="0"/>
-              <a:t>23/03/2022</a:t>
+              <a:t>24/03/2022</a:t>
             </a:fld>
             <a:endParaRPr lang="en-GB"/>
           </a:p>
@@ -2979,7 +2981,7 @@
           <a:p>
             <a:fld id="{3EE02DEA-DAE7-412D-98C1-743910D649DD}" type="datetimeFigureOut">
               <a:rPr lang="en-GB" smtClean="0"/>
-              <a:t>23/03/2022</a:t>
+              <a:t>24/03/2022</a:t>
             </a:fld>
             <a:endParaRPr lang="en-GB"/>
           </a:p>
@@ -3226,7 +3228,7 @@
           <a:p>
             <a:fld id="{3EE02DEA-DAE7-412D-98C1-743910D649DD}" type="datetimeFigureOut">
               <a:rPr lang="en-GB" smtClean="0"/>
-              <a:t>23/03/2022</a:t>
+              <a:t>24/03/2022</a:t>
             </a:fld>
             <a:endParaRPr lang="en-GB"/>
           </a:p>
@@ -3458,7 +3460,7 @@
           <a:p>
             <a:fld id="{3EE02DEA-DAE7-412D-98C1-743910D649DD}" type="datetimeFigureOut">
               <a:rPr lang="en-GB" smtClean="0"/>
-              <a:t>23/03/2022</a:t>
+              <a:t>24/03/2022</a:t>
             </a:fld>
             <a:endParaRPr lang="en-GB"/>
           </a:p>
@@ -3832,7 +3834,7 @@
           <a:p>
             <a:fld id="{3EE02DEA-DAE7-412D-98C1-743910D649DD}" type="datetimeFigureOut">
               <a:rPr lang="en-GB" smtClean="0"/>
-              <a:t>23/03/2022</a:t>
+              <a:t>24/03/2022</a:t>
             </a:fld>
             <a:endParaRPr lang="en-GB"/>
           </a:p>
@@ -3955,7 +3957,7 @@
           <a:p>
             <a:fld id="{3EE02DEA-DAE7-412D-98C1-743910D649DD}" type="datetimeFigureOut">
               <a:rPr lang="en-GB" smtClean="0"/>
-              <a:t>23/03/2022</a:t>
+              <a:t>24/03/2022</a:t>
             </a:fld>
             <a:endParaRPr lang="en-GB"/>
           </a:p>
@@ -4050,7 +4052,7 @@
           <a:p>
             <a:fld id="{3EE02DEA-DAE7-412D-98C1-743910D649DD}" type="datetimeFigureOut">
               <a:rPr lang="en-GB" smtClean="0"/>
-              <a:t>23/03/2022</a:t>
+              <a:t>24/03/2022</a:t>
             </a:fld>
             <a:endParaRPr lang="en-GB"/>
           </a:p>
@@ -4305,7 +4307,7 @@
           <a:p>
             <a:fld id="{3EE02DEA-DAE7-412D-98C1-743910D649DD}" type="datetimeFigureOut">
               <a:rPr lang="en-GB" smtClean="0"/>
-              <a:t>23/03/2022</a:t>
+              <a:t>24/03/2022</a:t>
             </a:fld>
             <a:endParaRPr lang="en-GB"/>
           </a:p>
@@ -4568,7 +4570,7 @@
           <a:p>
             <a:fld id="{3EE02DEA-DAE7-412D-98C1-743910D649DD}" type="datetimeFigureOut">
               <a:rPr lang="en-GB" smtClean="0"/>
-              <a:t>23/03/2022</a:t>
+              <a:t>24/03/2022</a:t>
             </a:fld>
             <a:endParaRPr lang="en-GB"/>
           </a:p>
@@ -5311,7 +5313,7 @@
           <a:p>
             <a:fld id="{3EE02DEA-DAE7-412D-98C1-743910D649DD}" type="datetimeFigureOut">
               <a:rPr lang="en-GB" smtClean="0"/>
-              <a:t>23/03/2022</a:t>
+              <a:t>24/03/2022</a:t>
             </a:fld>
             <a:endParaRPr lang="en-GB"/>
           </a:p>
@@ -5823,15 +5825,9 @@
   <p:cSld>
     <p:bg>
       <p:bgPr>
-        <a:blipFill dpi="0" rotWithShape="1">
-          <a:blip r:embed="rId2">
-            <a:lum/>
-          </a:blip>
-          <a:srcRect/>
-          <a:stretch>
-            <a:fillRect t="-9000" b="-9000"/>
-          </a:stretch>
-        </a:blipFill>
+        <a:solidFill>
+          <a:schemeClr val="accent1"/>
+        </a:solidFill>
         <a:effectLst/>
       </p:bgPr>
     </p:bg>
@@ -5867,18 +5863,37 @@
         </p:nvSpPr>
         <p:spPr>
           <a:xfrm>
-            <a:off x="1116542" y="1966384"/>
-            <a:ext cx="7766936" cy="1646302"/>
+            <a:off x="449790" y="2880550"/>
+            <a:ext cx="10058400" cy="1096899"/>
           </a:xfrm>
+          <a:noFill/>
         </p:spPr>
         <p:txBody>
           <a:bodyPr/>
           <a:lstStyle/>
           <a:p>
-            <a:r>
-              <a:rPr lang="en-GB" sz="6600" b="1" dirty="0"/>
-              <a:t>Lecture Finder</a:t>
-            </a:r>
+            <a:pPr algn="ctr"/>
+            <a:r>
+              <a:rPr lang="en-GB" sz="6000" b="1" dirty="0">
+                <a:solidFill>
+                  <a:schemeClr val="bg1"/>
+                </a:solidFill>
+              </a:rPr>
+              <a:t>Find my Lecture: </a:t>
+            </a:r>
+            <a:r>
+              <a:rPr lang="en-GB" sz="6000" b="1" dirty="0" err="1">
+                <a:solidFill>
+                  <a:schemeClr val="bg1"/>
+                </a:solidFill>
+              </a:rPr>
+              <a:t>LectureFinder</a:t>
+            </a:r>
+            <a:endParaRPr lang="en-GB" sz="6000" b="1" dirty="0">
+              <a:solidFill>
+                <a:schemeClr val="bg1"/>
+              </a:solidFill>
+            </a:endParaRPr>
           </a:p>
         </p:txBody>
       </p:sp>
@@ -5900,8 +5915,8 @@
         </p:nvSpPr>
         <p:spPr>
           <a:xfrm>
-            <a:off x="449792" y="4765208"/>
-            <a:ext cx="7766936" cy="1096899"/>
+            <a:off x="1170180" y="1009134"/>
+            <a:ext cx="8617621" cy="1096899"/>
           </a:xfrm>
         </p:spPr>
         <p:txBody>
@@ -5910,14 +5925,290 @@
           </a:bodyPr>
           <a:lstStyle/>
           <a:p>
+            <a:pPr algn="ctr"/>
             <a:r>
               <a:rPr lang="en-GB" sz="2000" b="1" dirty="0">
                 <a:solidFill>
                   <a:schemeClr val="bg1"/>
                 </a:solidFill>
               </a:rPr>
-              <a:t>By WAD2 Team 7A </a:t>
-            </a:r>
+              <a:t>COMPSCI 2021: Web App Development 2- Team Project</a:t>
+            </a:r>
+          </a:p>
+          <a:p>
+            <a:pPr algn="ctr"/>
+            <a:endParaRPr lang="en-GB" sz="2000" b="1" dirty="0">
+              <a:solidFill>
+                <a:schemeClr val="bg1"/>
+              </a:solidFill>
+            </a:endParaRPr>
+          </a:p>
+        </p:txBody>
+      </p:sp>
+      <p:sp>
+        <p:nvSpPr>
+          <p:cNvPr id="8" name="Subtitle 2">
+            <a:extLst>
+              <a:ext uri="{FF2B5EF4-FFF2-40B4-BE49-F238E27FC236}">
+                <a16:creationId xmlns:a16="http://schemas.microsoft.com/office/drawing/2014/main" id="{A895B5A1-E660-AA40-830D-C8B302F1DBD9}"/>
+              </a:ext>
+            </a:extLst>
+          </p:cNvPr>
+          <p:cNvSpPr txBox="1">
+            <a:spLocks/>
+          </p:cNvSpPr>
+          <p:nvPr/>
+        </p:nvSpPr>
+        <p:spPr>
+          <a:xfrm>
+            <a:off x="1170180" y="4509645"/>
+            <a:ext cx="8617621" cy="1096899"/>
+          </a:xfrm>
+          <a:prstGeom prst="rect">
+            <a:avLst/>
+          </a:prstGeom>
+        </p:spPr>
+        <p:txBody>
+          <a:bodyPr vert="horz" lIns="91440" tIns="45720" rIns="91440" bIns="45720" rtlCol="0" anchor="t">
+            <a:normAutofit/>
+          </a:bodyPr>
+          <a:lstStyle>
+            <a:lvl1pPr marL="0" indent="0" algn="r" defTabSz="457200" rtl="0" eaLnBrk="1" latinLnBrk="0" hangingPunct="1">
+              <a:spcBef>
+                <a:spcPts val="1000"/>
+              </a:spcBef>
+              <a:spcAft>
+                <a:spcPts val="0"/>
+              </a:spcAft>
+              <a:buClr>
+                <a:schemeClr val="accent1"/>
+              </a:buClr>
+              <a:buSzPct val="80000"/>
+              <a:buFont typeface="Wingdings 3" charset="2"/>
+              <a:buNone/>
+              <a:defRPr sz="1800" kern="1200">
+                <a:solidFill>
+                  <a:schemeClr val="tx1">
+                    <a:lumMod val="50000"/>
+                    <a:lumOff val="50000"/>
+                  </a:schemeClr>
+                </a:solidFill>
+                <a:latin typeface="+mn-lt"/>
+                <a:ea typeface="+mn-ea"/>
+                <a:cs typeface="+mn-cs"/>
+              </a:defRPr>
+            </a:lvl1pPr>
+            <a:lvl2pPr marL="457200" indent="0" algn="ctr" defTabSz="457200" rtl="0" eaLnBrk="1" latinLnBrk="0" hangingPunct="1">
+              <a:spcBef>
+                <a:spcPts val="1000"/>
+              </a:spcBef>
+              <a:spcAft>
+                <a:spcPts val="0"/>
+              </a:spcAft>
+              <a:buClr>
+                <a:schemeClr val="accent1"/>
+              </a:buClr>
+              <a:buSzPct val="80000"/>
+              <a:buFont typeface="Wingdings 3" charset="2"/>
+              <a:buNone/>
+              <a:defRPr sz="1600" kern="1200">
+                <a:solidFill>
+                  <a:schemeClr val="tx1">
+                    <a:tint val="75000"/>
+                  </a:schemeClr>
+                </a:solidFill>
+                <a:latin typeface="+mn-lt"/>
+                <a:ea typeface="+mn-ea"/>
+                <a:cs typeface="+mn-cs"/>
+              </a:defRPr>
+            </a:lvl2pPr>
+            <a:lvl3pPr marL="914400" indent="0" algn="ctr" defTabSz="457200" rtl="0" eaLnBrk="1" latinLnBrk="0" hangingPunct="1">
+              <a:spcBef>
+                <a:spcPts val="1000"/>
+              </a:spcBef>
+              <a:spcAft>
+                <a:spcPts val="0"/>
+              </a:spcAft>
+              <a:buClr>
+                <a:schemeClr val="accent1"/>
+              </a:buClr>
+              <a:buSzPct val="80000"/>
+              <a:buFont typeface="Wingdings 3" charset="2"/>
+              <a:buNone/>
+              <a:defRPr sz="1400" kern="1200">
+                <a:solidFill>
+                  <a:schemeClr val="tx1">
+                    <a:tint val="75000"/>
+                  </a:schemeClr>
+                </a:solidFill>
+                <a:latin typeface="+mn-lt"/>
+                <a:ea typeface="+mn-ea"/>
+                <a:cs typeface="+mn-cs"/>
+              </a:defRPr>
+            </a:lvl3pPr>
+            <a:lvl4pPr marL="1371600" indent="0" algn="ctr" defTabSz="457200" rtl="0" eaLnBrk="1" latinLnBrk="0" hangingPunct="1">
+              <a:spcBef>
+                <a:spcPts val="1000"/>
+              </a:spcBef>
+              <a:spcAft>
+                <a:spcPts val="0"/>
+              </a:spcAft>
+              <a:buClr>
+                <a:schemeClr val="accent1"/>
+              </a:buClr>
+              <a:buSzPct val="80000"/>
+              <a:buFont typeface="Wingdings 3" charset="2"/>
+              <a:buNone/>
+              <a:defRPr sz="1200" kern="1200">
+                <a:solidFill>
+                  <a:schemeClr val="tx1">
+                    <a:tint val="75000"/>
+                  </a:schemeClr>
+                </a:solidFill>
+                <a:latin typeface="+mn-lt"/>
+                <a:ea typeface="+mn-ea"/>
+                <a:cs typeface="+mn-cs"/>
+              </a:defRPr>
+            </a:lvl4pPr>
+            <a:lvl5pPr marL="1828800" indent="0" algn="ctr" defTabSz="457200" rtl="0" eaLnBrk="1" latinLnBrk="0" hangingPunct="1">
+              <a:spcBef>
+                <a:spcPts val="1000"/>
+              </a:spcBef>
+              <a:spcAft>
+                <a:spcPts val="0"/>
+              </a:spcAft>
+              <a:buClr>
+                <a:schemeClr val="accent1"/>
+              </a:buClr>
+              <a:buSzPct val="80000"/>
+              <a:buFont typeface="Wingdings 3" charset="2"/>
+              <a:buNone/>
+              <a:defRPr sz="1200" kern="1200">
+                <a:solidFill>
+                  <a:schemeClr val="tx1">
+                    <a:tint val="75000"/>
+                  </a:schemeClr>
+                </a:solidFill>
+                <a:latin typeface="+mn-lt"/>
+                <a:ea typeface="+mn-ea"/>
+                <a:cs typeface="+mn-cs"/>
+              </a:defRPr>
+            </a:lvl5pPr>
+            <a:lvl6pPr marL="2286000" indent="0" algn="ctr" defTabSz="457200" rtl="0" eaLnBrk="1" latinLnBrk="0" hangingPunct="1">
+              <a:spcBef>
+                <a:spcPts val="1000"/>
+              </a:spcBef>
+              <a:spcAft>
+                <a:spcPts val="0"/>
+              </a:spcAft>
+              <a:buClr>
+                <a:schemeClr val="accent1"/>
+              </a:buClr>
+              <a:buSzPct val="80000"/>
+              <a:buFont typeface="Wingdings 3" charset="2"/>
+              <a:buNone/>
+              <a:defRPr sz="1200" kern="1200">
+                <a:solidFill>
+                  <a:schemeClr val="tx1">
+                    <a:tint val="75000"/>
+                  </a:schemeClr>
+                </a:solidFill>
+                <a:latin typeface="+mn-lt"/>
+                <a:ea typeface="+mn-ea"/>
+                <a:cs typeface="+mn-cs"/>
+              </a:defRPr>
+            </a:lvl6pPr>
+            <a:lvl7pPr marL="2743200" indent="0" algn="ctr" defTabSz="457200" rtl="0" eaLnBrk="1" latinLnBrk="0" hangingPunct="1">
+              <a:spcBef>
+                <a:spcPts val="1000"/>
+              </a:spcBef>
+              <a:spcAft>
+                <a:spcPts val="0"/>
+              </a:spcAft>
+              <a:buClr>
+                <a:schemeClr val="accent1"/>
+              </a:buClr>
+              <a:buSzPct val="80000"/>
+              <a:buFont typeface="Wingdings 3" charset="2"/>
+              <a:buNone/>
+              <a:defRPr sz="1200" kern="1200">
+                <a:solidFill>
+                  <a:schemeClr val="tx1">
+                    <a:tint val="75000"/>
+                  </a:schemeClr>
+                </a:solidFill>
+                <a:latin typeface="+mn-lt"/>
+                <a:ea typeface="+mn-ea"/>
+                <a:cs typeface="+mn-cs"/>
+              </a:defRPr>
+            </a:lvl7pPr>
+            <a:lvl8pPr marL="3200400" indent="0" algn="ctr" defTabSz="457200" rtl="0" eaLnBrk="1" latinLnBrk="0" hangingPunct="1">
+              <a:spcBef>
+                <a:spcPts val="1000"/>
+              </a:spcBef>
+              <a:spcAft>
+                <a:spcPts val="0"/>
+              </a:spcAft>
+              <a:buClr>
+                <a:schemeClr val="accent1"/>
+              </a:buClr>
+              <a:buSzPct val="80000"/>
+              <a:buFont typeface="Wingdings 3" charset="2"/>
+              <a:buNone/>
+              <a:defRPr sz="1200" kern="1200">
+                <a:solidFill>
+                  <a:schemeClr val="tx1">
+                    <a:tint val="75000"/>
+                  </a:schemeClr>
+                </a:solidFill>
+                <a:latin typeface="+mn-lt"/>
+                <a:ea typeface="+mn-ea"/>
+                <a:cs typeface="+mn-cs"/>
+              </a:defRPr>
+            </a:lvl8pPr>
+            <a:lvl9pPr marL="3657600" indent="0" algn="ctr" defTabSz="457200" rtl="0" eaLnBrk="1" latinLnBrk="0" hangingPunct="1">
+              <a:spcBef>
+                <a:spcPts val="1000"/>
+              </a:spcBef>
+              <a:spcAft>
+                <a:spcPts val="0"/>
+              </a:spcAft>
+              <a:buClr>
+                <a:schemeClr val="accent1"/>
+              </a:buClr>
+              <a:buSzPct val="80000"/>
+              <a:buFont typeface="Wingdings 3" charset="2"/>
+              <a:buNone/>
+              <a:defRPr sz="1200" kern="1200">
+                <a:solidFill>
+                  <a:schemeClr val="tx1">
+                    <a:tint val="75000"/>
+                  </a:schemeClr>
+                </a:solidFill>
+                <a:latin typeface="+mn-lt"/>
+                <a:ea typeface="+mn-ea"/>
+                <a:cs typeface="+mn-cs"/>
+              </a:defRPr>
+            </a:lvl9pPr>
+          </a:lstStyle>
+          <a:p>
+            <a:pPr algn="ctr"/>
+            <a:r>
+              <a:rPr lang="en-GB" sz="2000" b="1" dirty="0">
+                <a:solidFill>
+                  <a:schemeClr val="bg1"/>
+                </a:solidFill>
+              </a:rPr>
+              <a:t>By Group 7A</a:t>
+            </a:r>
+          </a:p>
+          <a:p>
+            <a:pPr algn="ctr"/>
+            <a:endParaRPr lang="en-GB" sz="2000" b="1" dirty="0">
+              <a:solidFill>
+                <a:schemeClr val="bg1"/>
+              </a:solidFill>
+            </a:endParaRPr>
           </a:p>
         </p:txBody>
       </p:sp>
@@ -5967,14 +6258,19 @@
             <p:ph type="title"/>
           </p:nvPr>
         </p:nvSpPr>
-        <p:spPr/>
+        <p:spPr>
+          <a:xfrm>
+            <a:off x="677334" y="609600"/>
+            <a:ext cx="8596668" cy="879012"/>
+          </a:xfrm>
+        </p:spPr>
         <p:txBody>
           <a:bodyPr/>
           <a:lstStyle/>
           <a:p>
             <a:r>
               <a:rPr lang="en-GB" dirty="0"/>
-              <a:t>The concept</a:t>
+              <a:t>Find My Lecture: Overview</a:t>
             </a:r>
           </a:p>
         </p:txBody>
@@ -5995,32 +6291,80 @@
             <p:ph idx="1"/>
           </p:nvPr>
         </p:nvSpPr>
-        <p:spPr/>
-        <p:txBody>
-          <a:bodyPr/>
+        <p:spPr>
+          <a:xfrm>
+            <a:off x="677334" y="1488612"/>
+            <a:ext cx="8596668" cy="5010661"/>
+          </a:xfrm>
+        </p:spPr>
+        <p:txBody>
+          <a:bodyPr>
+            <a:normAutofit lnSpcReduction="10000"/>
+          </a:bodyPr>
           <a:lstStyle/>
           <a:p>
             <a:r>
               <a:rPr lang="en-US" sz="1800" dirty="0"/>
-              <a:t>The objective of this Web Application is to have a platform for professors to upload content (e.g. recorded lectures, reading materials and slides provided for various modules) as to help students find exact instances of a concept being referred to in in this content.</a:t>
+              <a:t>Find my Lecture is a platform for professors to upload Study materials in the form of recorded lectures, reading materials, slides and transcripts to help students find exact instances of specific concepts being referred among one or more modules of study</a:t>
+            </a:r>
+          </a:p>
+          <a:p>
+            <a:r>
+              <a:rPr lang="en-US" dirty="0"/>
+              <a:t>Students can perform keyword searches and get filtered results based on Professor Name / Module Name</a:t>
             </a:r>
           </a:p>
           <a:p>
             <a:r>
               <a:rPr lang="en-US" sz="1800" dirty="0"/>
-              <a:t>Users will be able to perform keyword searches and get filtered results based on professor name/module name</a:t>
-            </a:r>
-          </a:p>
-          <a:p>
-            <a:r>
-              <a:rPr lang="en-US" sz="1800" dirty="0"/>
-              <a:t>Users will also be able to create an account to save this content to their own profile.</a:t>
-            </a:r>
+              <a:t>Student </a:t>
+            </a:r>
+            <a:r>
+              <a:rPr lang="en-US" dirty="0"/>
+              <a:t>also have the flexibility to create an account where they can save searched content to their profile for future reference</a:t>
+            </a:r>
+            <a:endParaRPr lang="en-US" sz="1800" dirty="0"/>
           </a:p>
           <a:p>
             <a:r>
               <a:rPr lang="en-US" sz="1800" dirty="0"/>
               <a:t>Professors will be able to upload study materials for the students to save/highlight</a:t>
+            </a:r>
+          </a:p>
+          <a:p>
+            <a:r>
+              <a:rPr lang="en-US" dirty="0"/>
+              <a:t>Target audience: </a:t>
+            </a:r>
+          </a:p>
+          <a:p>
+            <a:pPr>
+              <a:buFontTx/>
+              <a:buChar char="-"/>
+            </a:pPr>
+            <a:r>
+              <a:rPr lang="en-US" sz="1600" dirty="0"/>
+              <a:t>Students wanting to revise specific concepts from previous semester/year</a:t>
+            </a:r>
+          </a:p>
+          <a:p>
+            <a:pPr>
+              <a:buFontTx/>
+              <a:buChar char="-"/>
+            </a:pPr>
+            <a:r>
+              <a:rPr lang="en-US" sz="1600" dirty="0"/>
+              <a:t>Mature students with limited time to go over each and every single concept- helps them cater their study by concept </a:t>
+            </a:r>
+          </a:p>
+          <a:p>
+            <a:pPr>
+              <a:buFontTx/>
+              <a:buChar char="-"/>
+            </a:pPr>
+            <a:r>
+              <a:rPr lang="en-US" sz="1600" dirty="0"/>
+              <a:t>Teaching Staff who’d like to provide ease of access to study materials in one place with student flexibility to access it</a:t>
             </a:r>
           </a:p>
         </p:txBody>
@@ -6057,10 +6401,10 @@
       </p:grpSpPr>
       <p:sp>
         <p:nvSpPr>
-          <p:cNvPr id="2" name="Title 1">
+          <p:cNvPr id="3" name="Content Placeholder 2">
             <a:extLst>
               <a:ext uri="{FF2B5EF4-FFF2-40B4-BE49-F238E27FC236}">
-                <a16:creationId xmlns:a16="http://schemas.microsoft.com/office/drawing/2014/main" id="{B7BF20CB-A273-486B-BFA1-EA3B9D873B82}"/>
+                <a16:creationId xmlns:a16="http://schemas.microsoft.com/office/drawing/2014/main" id="{C9900962-CA98-4B4A-B722-6392B89614FC}"/>
               </a:ext>
             </a:extLst>
           </p:cNvPr>
@@ -6068,27 +6412,62 @@
             <a:spLocks noGrp="1"/>
           </p:cNvSpPr>
           <p:nvPr>
-            <p:ph type="title"/>
-          </p:nvPr>
-        </p:nvSpPr>
-        <p:spPr/>
-        <p:txBody>
-          <a:bodyPr/>
+            <p:ph idx="1"/>
+          </p:nvPr>
+        </p:nvSpPr>
+        <p:spPr>
+          <a:xfrm>
+            <a:off x="677334" y="1752626"/>
+            <a:ext cx="8596668" cy="3880773"/>
+          </a:xfrm>
+        </p:spPr>
+        <p:txBody>
+          <a:bodyPr>
+            <a:normAutofit/>
+          </a:bodyPr>
           <a:lstStyle/>
           <a:p>
             <a:r>
               <a:rPr lang="en-GB" dirty="0"/>
-              <a:t>Product overview</a:t>
-            </a:r>
-          </a:p>
-        </p:txBody>
-      </p:sp>
-      <p:sp>
-        <p:nvSpPr>
-          <p:cNvPr id="3" name="Content Placeholder 2">
+              <a:t>Cascading Style Sheets &amp; HTML5</a:t>
+            </a:r>
+          </a:p>
+          <a:p>
+            <a:r>
+              <a:rPr lang="en-GB" dirty="0" err="1"/>
+              <a:t>Javascript</a:t>
+            </a:r>
+            <a:endParaRPr lang="en-GB" dirty="0"/>
+          </a:p>
+          <a:p>
+            <a:r>
+              <a:rPr lang="en-GB" dirty="0"/>
+              <a:t>Python </a:t>
+            </a:r>
+          </a:p>
+          <a:p>
+            <a:r>
+              <a:rPr lang="en-GB" dirty="0"/>
+              <a:t>PythonAnywhere</a:t>
+            </a:r>
+          </a:p>
+          <a:p>
+            <a:r>
+              <a:rPr lang="en-GB" dirty="0"/>
+              <a:t>Bootstrap</a:t>
+            </a:r>
+          </a:p>
+          <a:p>
+            <a:endParaRPr lang="en-GB" dirty="0"/>
+          </a:p>
+        </p:txBody>
+      </p:sp>
+      <p:sp>
+        <p:nvSpPr>
+          <p:cNvPr id="7" name="Title 1">
             <a:extLst>
               <a:ext uri="{FF2B5EF4-FFF2-40B4-BE49-F238E27FC236}">
-                <a16:creationId xmlns:a16="http://schemas.microsoft.com/office/drawing/2014/main" id="{63ED5301-AD50-4F7A-B618-9B6037EF7DA0}"/>
+                <a16:creationId xmlns:a16="http://schemas.microsoft.com/office/drawing/2014/main" id="{83A091DA-F57C-2E49-98BC-7D2B00CC4958}"/>
               </a:ext>
             </a:extLst>
           </p:cNvPr>
@@ -6096,22 +6475,30 @@
             <a:spLocks noGrp="1"/>
           </p:cNvSpPr>
           <p:nvPr>
-            <p:ph idx="1"/>
-          </p:nvPr>
-        </p:nvSpPr>
-        <p:spPr/>
+            <p:ph type="title"/>
+          </p:nvPr>
+        </p:nvSpPr>
+        <p:spPr>
+          <a:xfrm>
+            <a:off x="677334" y="609600"/>
+            <a:ext cx="8596668" cy="879012"/>
+          </a:xfrm>
+        </p:spPr>
         <p:txBody>
           <a:bodyPr/>
           <a:lstStyle/>
           <a:p>
-            <a:endParaRPr lang="en-GB" dirty="0"/>
+            <a:r>
+              <a:rPr lang="en-GB" dirty="0"/>
+              <a:t>Find My Lecture: Technologies Used</a:t>
+            </a:r>
           </a:p>
         </p:txBody>
       </p:sp>
     </p:spTree>
     <p:extLst>
       <p:ext uri="{BB962C8B-B14F-4D97-AF65-F5344CB8AC3E}">
-        <p14:creationId xmlns:p14="http://schemas.microsoft.com/office/powerpoint/2010/main" val="2773613496"/>
+        <p14:creationId xmlns:p14="http://schemas.microsoft.com/office/powerpoint/2010/main" val="981801288"/>
       </p:ext>
     </p:extLst>
   </p:cSld>
@@ -6143,7 +6530,7 @@
           <p:cNvPr id="2" name="Title 1">
             <a:extLst>
               <a:ext uri="{FF2B5EF4-FFF2-40B4-BE49-F238E27FC236}">
-                <a16:creationId xmlns:a16="http://schemas.microsoft.com/office/drawing/2014/main" id="{394866E2-EF50-4F67-9533-6E92D8BD8782}"/>
+                <a16:creationId xmlns:a16="http://schemas.microsoft.com/office/drawing/2014/main" id="{762C4EDD-7C4A-4B42-AFA2-B4C3DB293777}"/>
               </a:ext>
             </a:extLst>
           </p:cNvPr>
@@ -6160,8 +6547,8 @@
           <a:lstStyle/>
           <a:p>
             <a:r>
-              <a:rPr lang="en-GB" dirty="0"/>
-              <a:t>Technologies used</a:t>
+              <a:rPr lang="en-US" dirty="0"/>
+              <a:t>Summary of Team’s Contribution</a:t>
             </a:r>
           </a:p>
         </p:txBody>
@@ -6171,7 +6558,7 @@
           <p:cNvPr id="3" name="Content Placeholder 2">
             <a:extLst>
               <a:ext uri="{FF2B5EF4-FFF2-40B4-BE49-F238E27FC236}">
-                <a16:creationId xmlns:a16="http://schemas.microsoft.com/office/drawing/2014/main" id="{C9900962-CA98-4B4A-B722-6392B89614FC}"/>
+                <a16:creationId xmlns:a16="http://schemas.microsoft.com/office/drawing/2014/main" id="{AD5EBBEB-043F-5441-B570-F109D271A3C3}"/>
               </a:ext>
             </a:extLst>
           </p:cNvPr>
@@ -6182,47 +6569,24 @@
             <p:ph idx="1"/>
           </p:nvPr>
         </p:nvSpPr>
-        <p:spPr/>
+        <p:spPr>
+          <a:xfrm>
+            <a:off x="677334" y="1808896"/>
+            <a:ext cx="8596668" cy="3880773"/>
+          </a:xfrm>
+        </p:spPr>
         <p:txBody>
           <a:bodyPr/>
           <a:lstStyle/>
           <a:p>
-            <a:r>
-              <a:rPr lang="en-GB" dirty="0"/>
-              <a:t>CSS &amp; HTML</a:t>
-            </a:r>
-          </a:p>
-          <a:p>
-            <a:r>
-              <a:rPr lang="en-GB" dirty="0"/>
-              <a:t>JavaScript</a:t>
-            </a:r>
-          </a:p>
-          <a:p>
-            <a:pPr lvl="1"/>
-            <a:r>
-              <a:rPr lang="en-GB" dirty="0"/>
-              <a:t>We used JS to code functions like dark mode and popup forms</a:t>
-            </a:r>
-          </a:p>
-          <a:p>
-            <a:r>
-              <a:rPr lang="en-GB" dirty="0"/>
-              <a:t>Python</a:t>
-            </a:r>
-          </a:p>
-          <a:p>
-            <a:r>
-              <a:rPr lang="en-GB" dirty="0"/>
-              <a:t>PythonAnywhere</a:t>
-            </a:r>
+            <a:endParaRPr lang="en-US" dirty="0"/>
           </a:p>
         </p:txBody>
       </p:sp>
     </p:spTree>
     <p:extLst>
       <p:ext uri="{BB962C8B-B14F-4D97-AF65-F5344CB8AC3E}">
-        <p14:creationId xmlns:p14="http://schemas.microsoft.com/office/powerpoint/2010/main" val="981801288"/>
+        <p14:creationId xmlns:p14="http://schemas.microsoft.com/office/powerpoint/2010/main" val="1264792408"/>
       </p:ext>
     </p:extLst>
   </p:cSld>
@@ -6254,7 +6618,7 @@
           <p:cNvPr id="2" name="Title 1">
             <a:extLst>
               <a:ext uri="{FF2B5EF4-FFF2-40B4-BE49-F238E27FC236}">
-                <a16:creationId xmlns:a16="http://schemas.microsoft.com/office/drawing/2014/main" id="{3AAD78B7-FCDE-46E1-9A72-BFA68DB4C49D}"/>
+                <a16:creationId xmlns:a16="http://schemas.microsoft.com/office/drawing/2014/main" id="{07C523F7-0494-584B-B963-B6A4E5CE00F9}"/>
               </a:ext>
             </a:extLst>
           </p:cNvPr>
@@ -6271,8 +6635,8 @@
           <a:lstStyle/>
           <a:p>
             <a:r>
-              <a:rPr lang="en-GB" dirty="0"/>
-              <a:t>Front End</a:t>
+              <a:rPr lang="en-US" dirty="0"/>
+              <a:t>Features of the Web Application</a:t>
             </a:r>
           </a:p>
         </p:txBody>
@@ -6282,7 +6646,7 @@
           <p:cNvPr id="3" name="Content Placeholder 2">
             <a:extLst>
               <a:ext uri="{FF2B5EF4-FFF2-40B4-BE49-F238E27FC236}">
-                <a16:creationId xmlns:a16="http://schemas.microsoft.com/office/drawing/2014/main" id="{013E28E4-9249-4C5A-8C5D-F452377792AC}"/>
+                <a16:creationId xmlns:a16="http://schemas.microsoft.com/office/drawing/2014/main" id="{D2837114-24A8-E64E-9299-1B463D7B5B7E}"/>
               </a:ext>
             </a:extLst>
           </p:cNvPr>
@@ -6293,99 +6657,24 @@
             <p:ph idx="1"/>
           </p:nvPr>
         </p:nvSpPr>
-        <p:spPr/>
-        <p:txBody>
-          <a:bodyPr>
-            <a:normAutofit lnSpcReduction="10000"/>
-          </a:bodyPr>
-          <a:lstStyle/>
-          <a:p>
-            <a:r>
-              <a:rPr lang="en-GB" dirty="0"/>
-              <a:t>Styling</a:t>
-            </a:r>
-          </a:p>
-          <a:p>
-            <a:pPr lvl="1"/>
-            <a:r>
-              <a:rPr lang="en-GB" dirty="0"/>
-              <a:t>Goal was to make the application look polished and refined</a:t>
-            </a:r>
-          </a:p>
-          <a:p>
-            <a:pPr lvl="1"/>
-            <a:r>
-              <a:rPr lang="en-GB" dirty="0"/>
-              <a:t>So we made a separate </a:t>
-            </a:r>
-            <a:r>
-              <a:rPr lang="en-GB" dirty="0" err="1"/>
-              <a:t>css</a:t>
-            </a:r>
-            <a:r>
-              <a:rPr lang="en-GB" dirty="0"/>
-              <a:t> file to implement different styles and formatting into our application</a:t>
-            </a:r>
-          </a:p>
-          <a:p>
-            <a:r>
-              <a:rPr lang="en-GB" dirty="0"/>
-              <a:t>Templates</a:t>
-            </a:r>
-          </a:p>
-          <a:p>
-            <a:pPr lvl="1"/>
-            <a:r>
-              <a:rPr lang="en-GB" dirty="0"/>
-              <a:t>Used the inheritance nature of templates so reduce duplicity </a:t>
-            </a:r>
-          </a:p>
-          <a:p>
-            <a:pPr lvl="1"/>
-            <a:r>
-              <a:rPr lang="en-GB" dirty="0"/>
-              <a:t>Each web page inherits the base.html as to keep formatting </a:t>
-            </a:r>
-            <a:r>
-              <a:rPr lang="en-GB" dirty="0" err="1"/>
-              <a:t>consistant</a:t>
-            </a:r>
-            <a:endParaRPr lang="en-GB" dirty="0"/>
-          </a:p>
-          <a:p>
-            <a:r>
-              <a:rPr lang="en-GB" dirty="0"/>
-              <a:t>User authentication</a:t>
-            </a:r>
-          </a:p>
-          <a:p>
-            <a:pPr lvl="1"/>
-            <a:r>
-              <a:rPr lang="en-GB" dirty="0"/>
-              <a:t>We used JS to help us make our sign in and log in forms functional and forms.py to actually store the user information</a:t>
-            </a:r>
-          </a:p>
-          <a:p>
-            <a:pPr lvl="1"/>
-            <a:r>
-              <a:rPr lang="en-GB" dirty="0"/>
-              <a:t>We created custom </a:t>
-            </a:r>
-            <a:r>
-              <a:rPr lang="en-GB" dirty="0" err="1"/>
-              <a:t>css</a:t>
-            </a:r>
-            <a:r>
-              <a:rPr lang="en-GB" dirty="0"/>
-              <a:t> error messages that clearly state what went wrong to the user, whilst looking polished</a:t>
-            </a:r>
+        <p:spPr>
+          <a:xfrm>
+            <a:off x="677334" y="1724491"/>
+            <a:ext cx="8596668" cy="3880773"/>
+          </a:xfrm>
+        </p:spPr>
+        <p:txBody>
+          <a:bodyPr/>
+          <a:lstStyle/>
+          <a:p>
+            <a:endParaRPr lang="en-US"/>
           </a:p>
         </p:txBody>
       </p:sp>
     </p:spTree>
     <p:extLst>
       <p:ext uri="{BB962C8B-B14F-4D97-AF65-F5344CB8AC3E}">
-        <p14:creationId xmlns:p14="http://schemas.microsoft.com/office/powerpoint/2010/main" val="3565777637"/>
+        <p14:creationId xmlns:p14="http://schemas.microsoft.com/office/powerpoint/2010/main" val="1861220866"/>
       </p:ext>
     </p:extLst>
   </p:cSld>
@@ -6417,7 +6706,7 @@
           <p:cNvPr id="2" name="Title 1">
             <a:extLst>
               <a:ext uri="{FF2B5EF4-FFF2-40B4-BE49-F238E27FC236}">
-                <a16:creationId xmlns:a16="http://schemas.microsoft.com/office/drawing/2014/main" id="{004BA5BC-2C57-4273-BD32-A3A616D49070}"/>
+                <a16:creationId xmlns:a16="http://schemas.microsoft.com/office/drawing/2014/main" id="{3AAD78B7-FCDE-46E1-9A72-BFA68DB4C49D}"/>
               </a:ext>
             </a:extLst>
           </p:cNvPr>
@@ -6435,7 +6724,7 @@
           <a:p>
             <a:r>
               <a:rPr lang="en-GB" dirty="0"/>
-              <a:t>Back End</a:t>
+              <a:t>Approach: Front End</a:t>
             </a:r>
           </a:p>
         </p:txBody>
@@ -6445,7 +6734,7 @@
           <p:cNvPr id="3" name="Content Placeholder 2">
             <a:extLst>
               <a:ext uri="{FF2B5EF4-FFF2-40B4-BE49-F238E27FC236}">
-                <a16:creationId xmlns:a16="http://schemas.microsoft.com/office/drawing/2014/main" id="{F5BB5B4E-238E-4C71-A078-E69FDEC58AB8}"/>
+                <a16:creationId xmlns:a16="http://schemas.microsoft.com/office/drawing/2014/main" id="{013E28E4-9249-4C5A-8C5D-F452377792AC}"/>
               </a:ext>
             </a:extLst>
           </p:cNvPr>
@@ -6456,73 +6745,104 @@
             <p:ph idx="1"/>
           </p:nvPr>
         </p:nvSpPr>
-        <p:spPr/>
-        <p:txBody>
-          <a:bodyPr/>
+        <p:spPr>
+          <a:xfrm>
+            <a:off x="677334" y="1698134"/>
+            <a:ext cx="8596668" cy="3880773"/>
+          </a:xfrm>
+        </p:spPr>
+        <p:txBody>
+          <a:bodyPr>
+            <a:normAutofit lnSpcReduction="10000"/>
+          </a:bodyPr>
           <a:lstStyle/>
           <a:p>
             <a:r>
               <a:rPr lang="en-GB" dirty="0"/>
-              <a:t>Models</a:t>
+              <a:t>Styling</a:t>
             </a:r>
           </a:p>
           <a:p>
             <a:pPr lvl="1"/>
             <a:r>
               <a:rPr lang="en-GB" dirty="0"/>
-              <a:t>Based on ER diagram we created in the design spec (without the </a:t>
+              <a:t>Goal was to make the application look polished and refined</a:t>
+            </a:r>
+          </a:p>
+          <a:p>
+            <a:pPr lvl="1"/>
+            <a:r>
+              <a:rPr lang="en-GB" dirty="0"/>
+              <a:t>So we made a separate </a:t>
             </a:r>
             <a:r>
               <a:rPr lang="en-GB" dirty="0" err="1"/>
-              <a:t>moodle</a:t>
+              <a:t>css</a:t>
             </a:r>
             <a:r>
               <a:rPr lang="en-GB" dirty="0"/>
-              <a:t> API)</a:t>
+              <a:t> file to implement different styles and formatting into our application</a:t>
             </a:r>
           </a:p>
           <a:p>
             <a:r>
               <a:rPr lang="en-GB" dirty="0"/>
-              <a:t>Views</a:t>
+              <a:t>Templates</a:t>
             </a:r>
           </a:p>
           <a:p>
             <a:pPr lvl="1"/>
             <a:r>
               <a:rPr lang="en-GB" dirty="0"/>
-              <a:t>We have separate views for each web page</a:t>
-            </a:r>
-          </a:p>
-          <a:p>
+              <a:t>Used the inheritance nature of templates so reduce duplicity </a:t>
+            </a:r>
+          </a:p>
+          <a:p>
+            <a:pPr lvl="1"/>
             <a:r>
               <a:rPr lang="en-GB" dirty="0"/>
-              <a:t>Population script</a:t>
+              <a:t>Each web page inherits the base.html as to keep formatting </a:t>
+            </a:r>
+            <a:r>
+              <a:rPr lang="en-GB" dirty="0" err="1"/>
+              <a:t>consistant</a:t>
+            </a:r>
+            <a:endParaRPr lang="en-GB" dirty="0"/>
+          </a:p>
+          <a:p>
+            <a:r>
+              <a:rPr lang="en-GB" dirty="0"/>
+              <a:t>User authentication</a:t>
             </a:r>
           </a:p>
           <a:p>
             <a:pPr lvl="1"/>
             <a:r>
               <a:rPr lang="en-GB" dirty="0"/>
-              <a:t>We used this to store user information</a:t>
+              <a:t>We used JS to help us make our sign in and log in forms functional and forms.py to actually store the user information</a:t>
             </a:r>
           </a:p>
           <a:p>
             <a:pPr lvl="1"/>
             <a:r>
               <a:rPr lang="en-GB" dirty="0"/>
-              <a:t>We used this to store the lecture content</a:t>
-            </a:r>
-          </a:p>
-          <a:p>
-            <a:endParaRPr lang="en-GB" dirty="0"/>
+              <a:t>We created custom </a:t>
+            </a:r>
+            <a:r>
+              <a:rPr lang="en-GB" dirty="0" err="1"/>
+              <a:t>css</a:t>
+            </a:r>
+            <a:r>
+              <a:rPr lang="en-GB" dirty="0"/>
+              <a:t> error messages that clearly state what went wrong to the user, whilst looking polished</a:t>
+            </a:r>
           </a:p>
         </p:txBody>
       </p:sp>
     </p:spTree>
     <p:extLst>
       <p:ext uri="{BB962C8B-B14F-4D97-AF65-F5344CB8AC3E}">
-        <p14:creationId xmlns:p14="http://schemas.microsoft.com/office/powerpoint/2010/main" val="1313590333"/>
+        <p14:creationId xmlns:p14="http://schemas.microsoft.com/office/powerpoint/2010/main" val="3565777637"/>
       </p:ext>
     </p:extLst>
   </p:cSld>
@@ -6554,6 +6874,148 @@
           <p:cNvPr id="2" name="Title 1">
             <a:extLst>
               <a:ext uri="{FF2B5EF4-FFF2-40B4-BE49-F238E27FC236}">
+                <a16:creationId xmlns:a16="http://schemas.microsoft.com/office/drawing/2014/main" id="{004BA5BC-2C57-4273-BD32-A3A616D49070}"/>
+              </a:ext>
+            </a:extLst>
+          </p:cNvPr>
+          <p:cNvSpPr>
+            <a:spLocks noGrp="1"/>
+          </p:cNvSpPr>
+          <p:nvPr>
+            <p:ph type="title"/>
+          </p:nvPr>
+        </p:nvSpPr>
+        <p:spPr/>
+        <p:txBody>
+          <a:bodyPr/>
+          <a:lstStyle/>
+          <a:p>
+            <a:r>
+              <a:rPr lang="en-GB" dirty="0"/>
+              <a:t>Approach: Back End</a:t>
+            </a:r>
+          </a:p>
+        </p:txBody>
+      </p:sp>
+      <p:sp>
+        <p:nvSpPr>
+          <p:cNvPr id="3" name="Content Placeholder 2">
+            <a:extLst>
+              <a:ext uri="{FF2B5EF4-FFF2-40B4-BE49-F238E27FC236}">
+                <a16:creationId xmlns:a16="http://schemas.microsoft.com/office/drawing/2014/main" id="{F5BB5B4E-238E-4C71-A078-E69FDEC58AB8}"/>
+              </a:ext>
+            </a:extLst>
+          </p:cNvPr>
+          <p:cNvSpPr>
+            <a:spLocks noGrp="1"/>
+          </p:cNvSpPr>
+          <p:nvPr>
+            <p:ph idx="1"/>
+          </p:nvPr>
+        </p:nvSpPr>
+        <p:spPr>
+          <a:xfrm>
+            <a:off x="677334" y="1677113"/>
+            <a:ext cx="8596668" cy="3880773"/>
+          </a:xfrm>
+        </p:spPr>
+        <p:txBody>
+          <a:bodyPr/>
+          <a:lstStyle/>
+          <a:p>
+            <a:r>
+              <a:rPr lang="en-GB" dirty="0"/>
+              <a:t>Models</a:t>
+            </a:r>
+          </a:p>
+          <a:p>
+            <a:pPr lvl="1"/>
+            <a:r>
+              <a:rPr lang="en-GB" dirty="0"/>
+              <a:t>Based on ER diagram we created in the design spec (without the </a:t>
+            </a:r>
+            <a:r>
+              <a:rPr lang="en-GB" dirty="0" err="1"/>
+              <a:t>moodle</a:t>
+            </a:r>
+            <a:r>
+              <a:rPr lang="en-GB" dirty="0"/>
+              <a:t> API)</a:t>
+            </a:r>
+          </a:p>
+          <a:p>
+            <a:r>
+              <a:rPr lang="en-GB" dirty="0"/>
+              <a:t>Views</a:t>
+            </a:r>
+          </a:p>
+          <a:p>
+            <a:pPr lvl="1"/>
+            <a:r>
+              <a:rPr lang="en-GB" dirty="0"/>
+              <a:t>We have separate views for each web page</a:t>
+            </a:r>
+          </a:p>
+          <a:p>
+            <a:r>
+              <a:rPr lang="en-GB" dirty="0"/>
+              <a:t>Population script</a:t>
+            </a:r>
+          </a:p>
+          <a:p>
+            <a:pPr lvl="1"/>
+            <a:r>
+              <a:rPr lang="en-GB" dirty="0"/>
+              <a:t>We used this to store user information</a:t>
+            </a:r>
+          </a:p>
+          <a:p>
+            <a:pPr lvl="1"/>
+            <a:r>
+              <a:rPr lang="en-GB" dirty="0"/>
+              <a:t>We used this to store the lecture content</a:t>
+            </a:r>
+          </a:p>
+          <a:p>
+            <a:endParaRPr lang="en-GB" dirty="0"/>
+          </a:p>
+        </p:txBody>
+      </p:sp>
+    </p:spTree>
+    <p:extLst>
+      <p:ext uri="{BB962C8B-B14F-4D97-AF65-F5344CB8AC3E}">
+        <p14:creationId xmlns:p14="http://schemas.microsoft.com/office/powerpoint/2010/main" val="1313590333"/>
+      </p:ext>
+    </p:extLst>
+  </p:cSld>
+  <p:clrMapOvr>
+    <a:masterClrMapping/>
+  </p:clrMapOvr>
+</p:sld>
+</file>
+
+<file path=ppt/slides/slide8.xml><?xml version="1.0" encoding="utf-8"?>
+<p:sld xmlns:a="http://schemas.openxmlformats.org/drawingml/2006/main" xmlns:r="http://schemas.openxmlformats.org/officeDocument/2006/relationships" xmlns:p="http://schemas.openxmlformats.org/presentationml/2006/main">
+  <p:cSld>
+    <p:spTree>
+      <p:nvGrpSpPr>
+        <p:cNvPr id="1" name=""/>
+        <p:cNvGrpSpPr/>
+        <p:nvPr/>
+      </p:nvGrpSpPr>
+      <p:grpSpPr>
+        <a:xfrm>
+          <a:off x="0" y="0"/>
+          <a:ext cx="0" cy="0"/>
+          <a:chOff x="0" y="0"/>
+          <a:chExt cx="0" cy="0"/>
+        </a:xfrm>
+      </p:grpSpPr>
+      <p:sp>
+        <p:nvSpPr>
+          <p:cNvPr id="2" name="Title 1">
+            <a:extLst>
+              <a:ext uri="{FF2B5EF4-FFF2-40B4-BE49-F238E27FC236}">
                 <a16:creationId xmlns:a16="http://schemas.microsoft.com/office/drawing/2014/main" id="{0828EAA2-2D6D-4B08-A129-714158201CFE}"/>
               </a:ext>
             </a:extLst>
@@ -6606,6 +7068,163 @@
     <p:extLst>
       <p:ext uri="{BB962C8B-B14F-4D97-AF65-F5344CB8AC3E}">
         <p14:creationId xmlns:p14="http://schemas.microsoft.com/office/powerpoint/2010/main" val="915472291"/>
+      </p:ext>
+    </p:extLst>
+  </p:cSld>
+  <p:clrMapOvr>
+    <a:masterClrMapping/>
+  </p:clrMapOvr>
+</p:sld>
+</file>
+
+<file path=ppt/slides/slide9.xml><?xml version="1.0" encoding="utf-8"?>
+<p:sld xmlns:a="http://schemas.openxmlformats.org/drawingml/2006/main" xmlns:r="http://schemas.openxmlformats.org/officeDocument/2006/relationships" xmlns:p="http://schemas.openxmlformats.org/presentationml/2006/main">
+  <p:cSld>
+    <p:spTree>
+      <p:nvGrpSpPr>
+        <p:cNvPr id="1" name=""/>
+        <p:cNvGrpSpPr/>
+        <p:nvPr/>
+      </p:nvGrpSpPr>
+      <p:grpSpPr>
+        <a:xfrm>
+          <a:off x="0" y="0"/>
+          <a:ext cx="0" cy="0"/>
+          <a:chOff x="0" y="0"/>
+          <a:chExt cx="0" cy="0"/>
+        </a:xfrm>
+      </p:grpSpPr>
+      <p:sp>
+        <p:nvSpPr>
+          <p:cNvPr id="2" name="Title 1">
+            <a:extLst>
+              <a:ext uri="{FF2B5EF4-FFF2-40B4-BE49-F238E27FC236}">
+                <a16:creationId xmlns:a16="http://schemas.microsoft.com/office/drawing/2014/main" id="{6E4132BF-3F8C-AF4F-AA8A-6F5A821895D2}"/>
+              </a:ext>
+            </a:extLst>
+          </p:cNvPr>
+          <p:cNvSpPr>
+            <a:spLocks noGrp="1"/>
+          </p:cNvSpPr>
+          <p:nvPr>
+            <p:ph type="title"/>
+          </p:nvPr>
+        </p:nvSpPr>
+        <p:spPr/>
+        <p:txBody>
+          <a:bodyPr/>
+          <a:lstStyle/>
+          <a:p>
+            <a:r>
+              <a:rPr lang="en-US" dirty="0"/>
+              <a:t>Find My Lecture </a:t>
+            </a:r>
+          </a:p>
+        </p:txBody>
+      </p:sp>
+      <p:sp>
+        <p:nvSpPr>
+          <p:cNvPr id="3" name="Content Placeholder 2">
+            <a:extLst>
+              <a:ext uri="{FF2B5EF4-FFF2-40B4-BE49-F238E27FC236}">
+                <a16:creationId xmlns:a16="http://schemas.microsoft.com/office/drawing/2014/main" id="{A02A0C28-D512-D849-AFBD-9BE84D1F149C}"/>
+              </a:ext>
+            </a:extLst>
+          </p:cNvPr>
+          <p:cNvSpPr>
+            <a:spLocks noGrp="1"/>
+          </p:cNvSpPr>
+          <p:nvPr>
+            <p:ph idx="1"/>
+          </p:nvPr>
+        </p:nvSpPr>
+        <p:spPr/>
+        <p:txBody>
+          <a:bodyPr/>
+          <a:lstStyle/>
+          <a:p>
+            <a:r>
+              <a:rPr lang="en-US" dirty="0">
+                <a:hlinkClick r:id="rId2"/>
+              </a:rPr>
+              <a:t>https://github.com/Ishitanarsiker/WAD2_GroupProject</a:t>
+            </a:r>
+            <a:endParaRPr lang="en-US" dirty="0"/>
+          </a:p>
+          <a:p>
+            <a:r>
+              <a:rPr lang="en-US" dirty="0"/>
+              <a:t>Participants</a:t>
+            </a:r>
+          </a:p>
+          <a:p>
+            <a:pPr>
+              <a:buFont typeface="+mj-lt"/>
+              <a:buAutoNum type="arabicPeriod"/>
+            </a:pPr>
+            <a:r>
+              <a:rPr lang="en-US" dirty="0"/>
+              <a:t>Ishita Narsiker 2579990N</a:t>
+            </a:r>
+          </a:p>
+          <a:p>
+            <a:pPr>
+              <a:buFont typeface="+mj-lt"/>
+              <a:buAutoNum type="arabicPeriod"/>
+            </a:pPr>
+            <a:r>
+              <a:rPr lang="en-US" dirty="0"/>
+              <a:t>Amy Eden 2514468E</a:t>
+            </a:r>
+          </a:p>
+          <a:p>
+            <a:pPr>
+              <a:buFont typeface="+mj-lt"/>
+              <a:buAutoNum type="arabicPeriod"/>
+            </a:pPr>
+            <a:r>
+              <a:rPr lang="en-US" dirty="0"/>
+              <a:t>Luke Mullen 2542408M</a:t>
+            </a:r>
+          </a:p>
+          <a:p>
+            <a:pPr>
+              <a:buFont typeface="+mj-lt"/>
+              <a:buAutoNum type="arabicPeriod"/>
+            </a:pPr>
+            <a:r>
+              <a:rPr lang="en-US" dirty="0"/>
+              <a:t>Petros </a:t>
+            </a:r>
+            <a:r>
+              <a:rPr lang="en-US" dirty="0" err="1"/>
+              <a:t>Kitazos</a:t>
+            </a:r>
+            <a:r>
+              <a:rPr lang="en-US" dirty="0"/>
+              <a:t> 2526547K</a:t>
+            </a:r>
+          </a:p>
+          <a:p>
+            <a:pPr>
+              <a:buFont typeface="+mj-lt"/>
+              <a:buAutoNum type="arabicPeriod"/>
+            </a:pPr>
+            <a:r>
+              <a:rPr lang="en-US" dirty="0" err="1"/>
+              <a:t>SoonKwang</a:t>
+            </a:r>
+            <a:r>
+              <a:rPr lang="en-US" dirty="0"/>
+              <a:t> Hwang 2572157H</a:t>
+            </a:r>
+          </a:p>
+        </p:txBody>
+      </p:sp>
+    </p:spTree>
+    <p:extLst>
+      <p:ext uri="{BB962C8B-B14F-4D97-AF65-F5344CB8AC3E}">
+        <p14:creationId xmlns:p14="http://schemas.microsoft.com/office/powerpoint/2010/main" val="1043717794"/>
       </p:ext>
     </p:extLst>
   </p:cSld>

</xml_diff>